<commit_message>
Add PDF versions + Chinese translation of executive presentation
- Fix slide 14 card alignment and title/body text overlap
- Add Chinese (Simplified) version of all 19 slides
- Generate PDF exports for both English and Chinese versions
</commit_message>
<xml_diff>
--- a/research/agentic-landscape-executive.pptx
+++ b/research/agentic-landscape-executive.pptx
@@ -9250,7 +9250,7 @@
         </p:nvSpPr>
         <p:spPr>
           <a:xfrm>
-            <a:off x="731520" y="1280160"/>
+            <a:off x="518007" y="1280160"/>
             <a:ext cx="2011680" cy="3474720"/>
           </a:xfrm>
           <a:prstGeom prst="roundRect">
@@ -9295,7 +9295,7 @@
         </p:nvSpPr>
         <p:spPr>
           <a:xfrm>
-            <a:off x="731520" y="1280160"/>
+            <a:off x="518007" y="1280160"/>
             <a:ext cx="2011680" cy="45720"/>
           </a:xfrm>
           <a:prstGeom prst="rect">
@@ -9338,8 +9338,8 @@
         </p:nvSpPr>
         <p:spPr>
           <a:xfrm>
-            <a:off x="960120" y="1463039"/>
-            <a:ext cx="1554480" cy="365760"/>
+            <a:off x="746607" y="1463039"/>
+            <a:ext cx="1554480" cy="731520"/>
           </a:xfrm>
           <a:prstGeom prst="rect">
             <a:avLst/>
@@ -9378,8 +9378,8 @@
         </p:nvSpPr>
         <p:spPr>
           <a:xfrm>
-            <a:off x="960120" y="1874519"/>
-            <a:ext cx="1554480" cy="2743200"/>
+            <a:off x="746607" y="2286000"/>
+            <a:ext cx="1554480" cy="2331720"/>
           </a:xfrm>
           <a:prstGeom prst="rect">
             <a:avLst/>
@@ -9422,7 +9422,7 @@
         </p:nvSpPr>
         <p:spPr>
           <a:xfrm>
-            <a:off x="3017520" y="1280160"/>
+            <a:off x="2804007" y="1280160"/>
             <a:ext cx="2011680" cy="3474720"/>
           </a:xfrm>
           <a:prstGeom prst="roundRect">
@@ -9467,7 +9467,7 @@
         </p:nvSpPr>
         <p:spPr>
           <a:xfrm>
-            <a:off x="3017520" y="1280160"/>
+            <a:off x="2804007" y="1280160"/>
             <a:ext cx="2011680" cy="45720"/>
           </a:xfrm>
           <a:prstGeom prst="rect">
@@ -9510,8 +9510,8 @@
         </p:nvSpPr>
         <p:spPr>
           <a:xfrm>
-            <a:off x="3246120" y="1463039"/>
-            <a:ext cx="1554480" cy="365760"/>
+            <a:off x="3032607" y="1463039"/>
+            <a:ext cx="1554480" cy="731520"/>
           </a:xfrm>
           <a:prstGeom prst="rect">
             <a:avLst/>
@@ -9550,8 +9550,8 @@
         </p:nvSpPr>
         <p:spPr>
           <a:xfrm>
-            <a:off x="3246120" y="1874519"/>
-            <a:ext cx="1554480" cy="2743200"/>
+            <a:off x="3032607" y="2286000"/>
+            <a:ext cx="1554480" cy="2331720"/>
           </a:xfrm>
           <a:prstGeom prst="rect">
             <a:avLst/>
@@ -9594,7 +9594,7 @@
         </p:nvSpPr>
         <p:spPr>
           <a:xfrm>
-            <a:off x="5303520" y="1280160"/>
+            <a:off x="5090007" y="1280160"/>
             <a:ext cx="2011680" cy="3474720"/>
           </a:xfrm>
           <a:prstGeom prst="roundRect">
@@ -9639,7 +9639,7 @@
         </p:nvSpPr>
         <p:spPr>
           <a:xfrm>
-            <a:off x="5303520" y="1280160"/>
+            <a:off x="5090007" y="1280160"/>
             <a:ext cx="2011680" cy="45720"/>
           </a:xfrm>
           <a:prstGeom prst="rect">
@@ -9682,8 +9682,8 @@
         </p:nvSpPr>
         <p:spPr>
           <a:xfrm>
-            <a:off x="5532120" y="1463039"/>
-            <a:ext cx="1554480" cy="365760"/>
+            <a:off x="5318607" y="1463039"/>
+            <a:ext cx="1554480" cy="731520"/>
           </a:xfrm>
           <a:prstGeom prst="rect">
             <a:avLst/>
@@ -9722,8 +9722,8 @@
         </p:nvSpPr>
         <p:spPr>
           <a:xfrm>
-            <a:off x="5532120" y="1874519"/>
-            <a:ext cx="1554480" cy="2743200"/>
+            <a:off x="5318607" y="2286000"/>
+            <a:ext cx="1554480" cy="2331720"/>
           </a:xfrm>
           <a:prstGeom prst="rect">
             <a:avLst/>
@@ -9766,7 +9766,7 @@
         </p:nvSpPr>
         <p:spPr>
           <a:xfrm>
-            <a:off x="7589520" y="1280160"/>
+            <a:off x="7376007" y="1280160"/>
             <a:ext cx="2011680" cy="3474720"/>
           </a:xfrm>
           <a:prstGeom prst="roundRect">
@@ -9811,7 +9811,7 @@
         </p:nvSpPr>
         <p:spPr>
           <a:xfrm>
-            <a:off x="7589520" y="1280160"/>
+            <a:off x="7376007" y="1280160"/>
             <a:ext cx="2011680" cy="45720"/>
           </a:xfrm>
           <a:prstGeom prst="rect">
@@ -9854,8 +9854,8 @@
         </p:nvSpPr>
         <p:spPr>
           <a:xfrm>
-            <a:off x="7818120" y="1463039"/>
-            <a:ext cx="1554480" cy="365760"/>
+            <a:off x="7604607" y="1463039"/>
+            <a:ext cx="1554480" cy="731520"/>
           </a:xfrm>
           <a:prstGeom prst="rect">
             <a:avLst/>
@@ -9894,8 +9894,8 @@
         </p:nvSpPr>
         <p:spPr>
           <a:xfrm>
-            <a:off x="7818120" y="1874519"/>
-            <a:ext cx="1554480" cy="2743200"/>
+            <a:off x="7604607" y="2286000"/>
+            <a:ext cx="1554480" cy="2331720"/>
           </a:xfrm>
           <a:prstGeom prst="rect">
             <a:avLst/>
@@ -9938,7 +9938,7 @@
         </p:nvSpPr>
         <p:spPr>
           <a:xfrm>
-            <a:off x="9875520" y="1280160"/>
+            <a:off x="9662007" y="1280160"/>
             <a:ext cx="2011680" cy="3474720"/>
           </a:xfrm>
           <a:prstGeom prst="roundRect">
@@ -9983,7 +9983,7 @@
         </p:nvSpPr>
         <p:spPr>
           <a:xfrm>
-            <a:off x="9875520" y="1280160"/>
+            <a:off x="9662007" y="1280160"/>
             <a:ext cx="2011680" cy="45720"/>
           </a:xfrm>
           <a:prstGeom prst="rect">
@@ -10026,8 +10026,8 @@
         </p:nvSpPr>
         <p:spPr>
           <a:xfrm>
-            <a:off x="10104120" y="1463039"/>
-            <a:ext cx="1554480" cy="365760"/>
+            <a:off x="9890607" y="1463039"/>
+            <a:ext cx="1554480" cy="731520"/>
           </a:xfrm>
           <a:prstGeom prst="rect">
             <a:avLst/>
@@ -10066,8 +10066,8 @@
         </p:nvSpPr>
         <p:spPr>
           <a:xfrm>
-            <a:off x="10104120" y="1874519"/>
-            <a:ext cx="1554480" cy="2743200"/>
+            <a:off x="9890607" y="2286000"/>
+            <a:ext cx="1554480" cy="2331720"/>
           </a:xfrm>
           <a:prstGeom prst="rect">
             <a:avLst/>

</xml_diff>